<commit_message>
Add a withDeadline method to TransactionBuilder and make changes to Model component class diagram.
Signed-off-by: aaditkamat <aadit.k12@gmail.com>
</commit_message>
<xml_diff>
--- a/docs/diagrams/ModelComponentClassDiagram.pptx
+++ b/docs/diagrams/ModelComponentClassDiagram.pptx
@@ -208,7 +208,7 @@
           <a:p>
             <a:fld id="{F5CC4B3F-88C1-4FFA-B1B6-F41C21DC6924}" type="datetimeFigureOut">
               <a:rPr lang="en-US" smtClean="0"/>
-              <a:t>6/27/2018</a:t>
+              <a:t>10/23/18</a:t>
             </a:fld>
             <a:endParaRPr lang="en-US"/>
           </a:p>
@@ -654,7 +654,7 @@
           <a:p>
             <a:fld id="{78C97017-6FC3-485B-9764-EAC9E56C1D49}" type="datetimeFigureOut">
               <a:rPr lang="en-US" smtClean="0"/>
-              <a:t>6/27/2018</a:t>
+              <a:t>10/23/18</a:t>
             </a:fld>
             <a:endParaRPr lang="en-US"/>
           </a:p>
@@ -822,7 +822,7 @@
           <a:p>
             <a:fld id="{78C97017-6FC3-485B-9764-EAC9E56C1D49}" type="datetimeFigureOut">
               <a:rPr lang="en-US" smtClean="0"/>
-              <a:t>6/27/2018</a:t>
+              <a:t>10/23/18</a:t>
             </a:fld>
             <a:endParaRPr lang="en-US"/>
           </a:p>
@@ -1000,7 +1000,7 @@
           <a:p>
             <a:fld id="{78C97017-6FC3-485B-9764-EAC9E56C1D49}" type="datetimeFigureOut">
               <a:rPr lang="en-US" smtClean="0"/>
-              <a:t>6/27/2018</a:t>
+              <a:t>10/23/18</a:t>
             </a:fld>
             <a:endParaRPr lang="en-US"/>
           </a:p>
@@ -1168,7 +1168,7 @@
           <a:p>
             <a:fld id="{78C97017-6FC3-485B-9764-EAC9E56C1D49}" type="datetimeFigureOut">
               <a:rPr lang="en-US" smtClean="0"/>
-              <a:t>6/27/2018</a:t>
+              <a:t>10/23/18</a:t>
             </a:fld>
             <a:endParaRPr lang="en-US"/>
           </a:p>
@@ -1413,7 +1413,7 @@
           <a:p>
             <a:fld id="{78C97017-6FC3-485B-9764-EAC9E56C1D49}" type="datetimeFigureOut">
               <a:rPr lang="en-US" smtClean="0"/>
-              <a:t>6/27/2018</a:t>
+              <a:t>10/23/18</a:t>
             </a:fld>
             <a:endParaRPr lang="en-US"/>
           </a:p>
@@ -1698,7 +1698,7 @@
           <a:p>
             <a:fld id="{78C97017-6FC3-485B-9764-EAC9E56C1D49}" type="datetimeFigureOut">
               <a:rPr lang="en-US" smtClean="0"/>
-              <a:t>6/27/2018</a:t>
+              <a:t>10/23/18</a:t>
             </a:fld>
             <a:endParaRPr lang="en-US"/>
           </a:p>
@@ -2117,7 +2117,7 @@
           <a:p>
             <a:fld id="{78C97017-6FC3-485B-9764-EAC9E56C1D49}" type="datetimeFigureOut">
               <a:rPr lang="en-US" smtClean="0"/>
-              <a:t>6/27/2018</a:t>
+              <a:t>10/23/18</a:t>
             </a:fld>
             <a:endParaRPr lang="en-US"/>
           </a:p>
@@ -2234,7 +2234,7 @@
           <a:p>
             <a:fld id="{78C97017-6FC3-485B-9764-EAC9E56C1D49}" type="datetimeFigureOut">
               <a:rPr lang="en-US" smtClean="0"/>
-              <a:t>6/27/2018</a:t>
+              <a:t>10/23/18</a:t>
             </a:fld>
             <a:endParaRPr lang="en-US"/>
           </a:p>
@@ -2329,7 +2329,7 @@
           <a:p>
             <a:fld id="{78C97017-6FC3-485B-9764-EAC9E56C1D49}" type="datetimeFigureOut">
               <a:rPr lang="en-US" smtClean="0"/>
-              <a:t>6/27/2018</a:t>
+              <a:t>10/23/18</a:t>
             </a:fld>
             <a:endParaRPr lang="en-US"/>
           </a:p>
@@ -2604,7 +2604,7 @@
           <a:p>
             <a:fld id="{78C97017-6FC3-485B-9764-EAC9E56C1D49}" type="datetimeFigureOut">
               <a:rPr lang="en-US" smtClean="0"/>
-              <a:t>6/27/2018</a:t>
+              <a:t>10/23/18</a:t>
             </a:fld>
             <a:endParaRPr lang="en-US"/>
           </a:p>
@@ -2856,7 +2856,7 @@
           <a:p>
             <a:fld id="{78C97017-6FC3-485B-9764-EAC9E56C1D49}" type="datetimeFigureOut">
               <a:rPr lang="en-US" smtClean="0"/>
-              <a:t>6/27/2018</a:t>
+              <a:t>10/23/18</a:t>
             </a:fld>
             <a:endParaRPr lang="en-US"/>
           </a:p>
@@ -3067,7 +3067,7 @@
           <a:p>
             <a:fld id="{78C97017-6FC3-485B-9764-EAC9E56C1D49}" type="datetimeFigureOut">
               <a:rPr lang="en-US" smtClean="0"/>
-              <a:t>6/27/2018</a:t>
+              <a:t>10/23/18</a:t>
             </a:fld>
             <a:endParaRPr lang="en-US"/>
           </a:p>
@@ -3450,8 +3450,8 @@
         </p:nvSpPr>
         <p:spPr>
           <a:xfrm>
-            <a:off x="1119865" y="1600200"/>
-            <a:ext cx="7490735" cy="3124200"/>
+            <a:off x="457201" y="1600200"/>
+            <a:ext cx="8153400" cy="3581400"/>
           </a:xfrm>
           <a:prstGeom prst="roundRect">
             <a:avLst>
@@ -3570,7 +3570,7 @@
         </p:nvSpPr>
         <p:spPr>
           <a:xfrm rot="16200000">
-            <a:off x="1661548" y="3097750"/>
+            <a:off x="1531563" y="3089802"/>
             <a:ext cx="1093635" cy="346760"/>
           </a:xfrm>
           <a:prstGeom prst="rect">
@@ -3621,33 +3621,27 @@
           </a:p>
         </p:txBody>
       </p:sp>
-      <p:cxnSp>
-        <p:nvCxnSpPr>
-          <p:cNvPr id="107" name="Elbow Connector 106"/>
-          <p:cNvCxnSpPr>
-            <a:cxnSpLocks/>
-            <a:stCxn id="9" idx="1"/>
-            <a:endCxn id="62" idx="2"/>
-          </p:cNvCxnSpPr>
+      <p:sp>
+        <p:nvSpPr>
+          <p:cNvPr id="119" name="Rectangle 62"/>
+          <p:cNvSpPr/>
           <p:nvPr/>
-        </p:nvCxnSpPr>
-        <p:spPr>
-          <a:xfrm rot="5400000" flipH="1" flipV="1">
-            <a:off x="4131507" y="1281685"/>
-            <a:ext cx="613122" cy="4459404"/>
-          </a:xfrm>
-          <a:prstGeom prst="bentConnector3">
-            <a:avLst>
-              <a:gd name="adj1" fmla="val -26668"/>
-            </a:avLst>
+        </p:nvSpPr>
+        <p:spPr>
+          <a:xfrm rot="16200000">
+            <a:off x="651402" y="2861202"/>
+            <a:ext cx="1093635" cy="346760"/>
+          </a:xfrm>
+          <a:prstGeom prst="rect">
+            <a:avLst/>
           </a:prstGeom>
+          <a:solidFill>
+            <a:srgbClr val="7030A0"/>
+          </a:solidFill>
           <a:ln w="19050">
             <a:solidFill>
               <a:srgbClr val="7030A0"/>
             </a:solidFill>
-            <a:prstDash val="solid"/>
-            <a:headEnd type="none" w="med" len="med"/>
-            <a:tailEnd type="arrow" w="med" len="med"/>
           </a:ln>
           <a:effectLst/>
         </p:spPr>
@@ -3665,45 +3659,6 @@
             <a:schemeClr val="dk1"/>
           </a:fontRef>
         </p:style>
-      </p:cxnSp>
-      <p:sp>
-        <p:nvSpPr>
-          <p:cNvPr id="119" name="Rectangle 62"/>
-          <p:cNvSpPr/>
-          <p:nvPr/>
-        </p:nvSpPr>
-        <p:spPr>
-          <a:xfrm rot="16200000">
-            <a:off x="956202" y="2861202"/>
-            <a:ext cx="1093635" cy="346760"/>
-          </a:xfrm>
-          <a:prstGeom prst="rect">
-            <a:avLst/>
-          </a:prstGeom>
-          <a:solidFill>
-            <a:srgbClr val="7030A0"/>
-          </a:solidFill>
-          <a:ln w="19050">
-            <a:solidFill>
-              <a:srgbClr val="7030A0"/>
-            </a:solidFill>
-          </a:ln>
-          <a:effectLst/>
-        </p:spPr>
-        <p:style>
-          <a:lnRef idx="1">
-            <a:schemeClr val="accent2"/>
-          </a:lnRef>
-          <a:fillRef idx="2">
-            <a:schemeClr val="accent2"/>
-          </a:fillRef>
-          <a:effectRef idx="1">
-            <a:schemeClr val="accent2"/>
-          </a:effectRef>
-          <a:fontRef idx="minor">
-            <a:schemeClr val="dk1"/>
-          </a:fontRef>
-        </p:style>
         <p:txBody>
           <a:bodyPr rtlCol="0" anchor="ctr"/>
           <a:lstStyle/>
@@ -3744,7 +3699,7 @@
         </p:nvSpPr>
         <p:spPr>
           <a:xfrm rot="16200000">
-            <a:off x="1626910" y="2952291"/>
+            <a:off x="1377186" y="3095491"/>
             <a:ext cx="270504" cy="175523"/>
           </a:xfrm>
           <a:prstGeom prst="triangle">
@@ -3787,15 +3742,14 @@
         <p:nvCxnSpPr>
           <p:cNvPr id="58" name="Straight Arrow Connector 57"/>
           <p:cNvCxnSpPr>
-            <a:stCxn id="42" idx="3"/>
-            <a:endCxn id="2" idx="1"/>
+            <a:cxnSpLocks/>
           </p:cNvCxnSpPr>
           <p:nvPr/>
         </p:nvCxnSpPr>
         <p:spPr>
           <a:xfrm>
-            <a:off x="2609828" y="3636620"/>
-            <a:ext cx="267352" cy="0"/>
+            <a:off x="2525903" y="3636620"/>
+            <a:ext cx="293497" cy="0"/>
           </a:xfrm>
           <a:prstGeom prst="straightConnector1">
             <a:avLst/>
@@ -3832,7 +3786,7 @@
         </p:nvCxnSpPr>
         <p:spPr>
           <a:xfrm>
-            <a:off x="910091" y="3040053"/>
+            <a:off x="533400" y="3040053"/>
             <a:ext cx="419548" cy="2860"/>
           </a:xfrm>
           <a:prstGeom prst="bentConnector3">
@@ -3871,13 +3825,14 @@
         <p:nvCxnSpPr>
           <p:cNvPr id="21" name="Straight Connector 20"/>
           <p:cNvCxnSpPr>
+            <a:cxnSpLocks/>
             <a:stCxn id="120" idx="3"/>
           </p:cNvCxnSpPr>
           <p:nvPr/>
         </p:nvCxnSpPr>
         <p:spPr>
           <a:xfrm flipV="1">
-            <a:off x="1849924" y="3040052"/>
+            <a:off x="1600200" y="3183252"/>
             <a:ext cx="216105" cy="1"/>
           </a:xfrm>
           <a:prstGeom prst="line">
@@ -3916,7 +3871,7 @@
         </p:nvSpPr>
         <p:spPr>
           <a:xfrm>
-            <a:off x="2373780" y="3549930"/>
+            <a:off x="2286000" y="3549930"/>
             <a:ext cx="236048" cy="173380"/>
           </a:xfrm>
           <a:prstGeom prst="flowChartDecision">
@@ -3962,7 +3917,7 @@
         <p:spPr>
           <a:xfrm>
             <a:off x="2825280" y="2846162"/>
-            <a:ext cx="1490560" cy="334856"/>
+            <a:ext cx="1746720" cy="334856"/>
           </a:xfrm>
           <a:prstGeom prst="rect">
             <a:avLst/>
@@ -3994,12 +3949,12 @@
           <a:p>
             <a:pPr algn="ctr"/>
             <a:r>
-              <a:rPr lang="en-US" sz="1050" dirty="0" err="1" smtClean="0">
+              <a:rPr lang="en-US" sz="1050" dirty="0" err="1">
                 <a:solidFill>
                   <a:srgbClr val="7030A0"/>
                 </a:solidFill>
               </a:rPr>
-              <a:t>VersionedAddressBook</a:t>
+              <a:t>VersionedFinancialDatabase</a:t>
             </a:r>
             <a:endParaRPr lang="en-SG" sz="1050" dirty="0">
               <a:solidFill>
@@ -4013,6 +3968,7 @@
         <p:nvCxnSpPr>
           <p:cNvPr id="47" name="Straight Arrow Connector 46"/>
           <p:cNvCxnSpPr>
+            <a:cxnSpLocks/>
             <a:stCxn id="48" idx="3"/>
             <a:endCxn id="46" idx="1"/>
           </p:cNvCxnSpPr>
@@ -4020,8 +3976,8 @@
         </p:nvCxnSpPr>
         <p:spPr>
           <a:xfrm>
-            <a:off x="2624360" y="3003033"/>
-            <a:ext cx="200920" cy="10557"/>
+            <a:off x="2522048" y="3003033"/>
+            <a:ext cx="303232" cy="10557"/>
           </a:xfrm>
           <a:prstGeom prst="straightConnector1">
             <a:avLst/>
@@ -4058,7 +4014,7 @@
         </p:nvSpPr>
         <p:spPr>
           <a:xfrm>
-            <a:off x="2388312" y="2916343"/>
+            <a:off x="2286000" y="2916343"/>
             <a:ext cx="236048" cy="173380"/>
           </a:xfrm>
           <a:prstGeom prst="flowChartDecision">
@@ -4091,7 +4047,7 @@
           <a:lstStyle/>
           <a:p>
             <a:pPr algn="ctr"/>
-            <a:endParaRPr lang="en-US" sz="1050"/>
+            <a:endParaRPr lang="en-US" sz="1050" dirty="0"/>
           </a:p>
         </p:txBody>
       </p:sp>
@@ -4103,8 +4059,8 @@
         </p:nvSpPr>
         <p:spPr>
           <a:xfrm>
-            <a:off x="4692650" y="2846162"/>
-            <a:ext cx="1156969" cy="346760"/>
+            <a:off x="5156708" y="2837441"/>
+            <a:ext cx="1413101" cy="346760"/>
           </a:xfrm>
           <a:prstGeom prst="rect">
             <a:avLst/>
@@ -4141,7 +4097,7 @@
                   <a:srgbClr val="7030A0"/>
                 </a:solidFill>
               </a:rPr>
-              <a:t>UniquePersonList</a:t>
+              <a:t>UniqueTransactionList</a:t>
             </a:r>
             <a:endParaRPr lang="en-SG" sz="1050" dirty="0">
               <a:solidFill>
@@ -4159,7 +4115,7 @@
         </p:nvSpPr>
         <p:spPr>
           <a:xfrm>
-            <a:off x="4324972" y="2920532"/>
+            <a:off x="4585918" y="2924537"/>
             <a:ext cx="236048" cy="173380"/>
           </a:xfrm>
           <a:prstGeom prst="flowChartDecision">
@@ -4206,8 +4162,8 @@
         </p:nvSpPr>
         <p:spPr>
           <a:xfrm>
-            <a:off x="6313677" y="2858066"/>
-            <a:ext cx="708186" cy="346760"/>
+            <a:off x="7139945" y="2846162"/>
+            <a:ext cx="979216" cy="346760"/>
           </a:xfrm>
           <a:prstGeom prst="rect">
             <a:avLst/>
@@ -4244,7 +4200,7 @@
                   <a:srgbClr val="7030A0"/>
                 </a:solidFill>
               </a:rPr>
-              <a:t>Person</a:t>
+              <a:t>Transaction</a:t>
             </a:r>
             <a:endParaRPr lang="en-SG" sz="1050" dirty="0">
               <a:solidFill>
@@ -4262,7 +4218,7 @@
         </p:nvSpPr>
         <p:spPr>
           <a:xfrm>
-            <a:off x="5858751" y="2941676"/>
+            <a:off x="6569809" y="2911893"/>
             <a:ext cx="236048" cy="173380"/>
           </a:xfrm>
           <a:prstGeom prst="flowChartDecision">
@@ -4301,17 +4257,17 @@
       </p:sp>
       <p:cxnSp>
         <p:nvCxnSpPr>
-          <p:cNvPr id="64" name="Elbow Connector 63"/>
+          <p:cNvPr id="81" name="Elbow Connector 80"/>
           <p:cNvCxnSpPr>
-            <a:stCxn id="63" idx="3"/>
-            <a:endCxn id="62" idx="1"/>
+            <a:stCxn id="78" idx="3"/>
+            <a:endCxn id="80" idx="1"/>
           </p:cNvCxnSpPr>
           <p:nvPr/>
         </p:nvCxnSpPr>
         <p:spPr>
-          <a:xfrm>
-            <a:off x="6094799" y="3028366"/>
-            <a:ext cx="218878" cy="3080"/>
+          <a:xfrm flipV="1">
+            <a:off x="7326275" y="5624008"/>
+            <a:ext cx="434402" cy="4783"/>
           </a:xfrm>
           <a:prstGeom prst="bentConnector3">
             <a:avLst/>
@@ -4340,121 +4296,19 @@
           </a:fontRef>
         </p:style>
       </p:cxnSp>
-      <p:sp>
-        <p:nvSpPr>
-          <p:cNvPr id="76" name="Rectangle 8"/>
-          <p:cNvSpPr/>
-          <p:nvPr/>
-        </p:nvSpPr>
-        <p:spPr>
-          <a:xfrm>
-            <a:off x="7712397" y="2564238"/>
-            <a:ext cx="708186" cy="285783"/>
-          </a:xfrm>
-          <a:prstGeom prst="rect">
-            <a:avLst/>
-          </a:prstGeom>
-          <a:ln w="19050">
-            <a:solidFill>
-              <a:srgbClr val="7030A0"/>
-            </a:solidFill>
-          </a:ln>
-          <a:effectLst/>
-        </p:spPr>
-        <p:style>
-          <a:lnRef idx="1">
-            <a:schemeClr val="accent4"/>
-          </a:lnRef>
-          <a:fillRef idx="2">
-            <a:schemeClr val="accent4"/>
-          </a:fillRef>
-          <a:effectRef idx="1">
-            <a:schemeClr val="accent4"/>
-          </a:effectRef>
-          <a:fontRef idx="minor">
-            <a:schemeClr val="dk1"/>
-          </a:fontRef>
-        </p:style>
-        <p:txBody>
-          <a:bodyPr rtlCol="0" anchor="ctr"/>
-          <a:lstStyle/>
-          <a:p>
-            <a:pPr algn="ctr"/>
-            <a:r>
-              <a:rPr lang="en-US" sz="1050" dirty="0">
-                <a:solidFill>
-                  <a:srgbClr val="7030A0"/>
-                </a:solidFill>
-              </a:rPr>
-              <a:t>Name</a:t>
-            </a:r>
-            <a:endParaRPr lang="en-SG" sz="1050" dirty="0">
-              <a:solidFill>
-                <a:srgbClr val="7030A0"/>
-              </a:solidFill>
-            </a:endParaRPr>
-          </a:p>
-        </p:txBody>
-      </p:sp>
-      <p:sp>
-        <p:nvSpPr>
-          <p:cNvPr id="78" name="Flowchart: Decision 96"/>
-          <p:cNvSpPr/>
-          <p:nvPr/>
-        </p:nvSpPr>
-        <p:spPr>
-          <a:xfrm>
-            <a:off x="7041947" y="2948201"/>
-            <a:ext cx="236048" cy="173380"/>
-          </a:xfrm>
-          <a:prstGeom prst="flowChartDecision">
-            <a:avLst/>
-          </a:prstGeom>
-          <a:solidFill>
-            <a:srgbClr val="7030A0"/>
-          </a:solidFill>
-          <a:ln w="19050">
-            <a:solidFill>
-              <a:srgbClr val="7030A0"/>
-            </a:solidFill>
-          </a:ln>
-          <a:effectLst/>
-        </p:spPr>
-        <p:style>
-          <a:lnRef idx="1">
-            <a:schemeClr val="accent6"/>
-          </a:lnRef>
-          <a:fillRef idx="2">
-            <a:schemeClr val="accent6"/>
-          </a:fillRef>
-          <a:effectRef idx="1">
-            <a:schemeClr val="accent6"/>
-          </a:effectRef>
-          <a:fontRef idx="minor">
-            <a:schemeClr val="dk1"/>
-          </a:fontRef>
-        </p:style>
-        <p:txBody>
-          <a:bodyPr rtlCol="0" anchor="ctr"/>
-          <a:lstStyle/>
-          <a:p>
-            <a:pPr algn="ctr"/>
-            <a:endParaRPr lang="en-US" sz="1050"/>
-          </a:p>
-        </p:txBody>
-      </p:sp>
       <p:cxnSp>
         <p:nvCxnSpPr>
-          <p:cNvPr id="79" name="Elbow Connector 78"/>
+          <p:cNvPr id="84" name="Elbow Connector 83"/>
           <p:cNvCxnSpPr>
-            <a:cxnSpLocks/>
+            <a:stCxn id="78" idx="3"/>
+            <a:endCxn id="83" idx="1"/>
           </p:cNvCxnSpPr>
           <p:nvPr/>
         </p:nvCxnSpPr>
         <p:spPr>
-          <a:xfrm flipV="1">
-            <a:off x="7277995" y="2706821"/>
-            <a:ext cx="434402" cy="327761"/>
+          <a:xfrm>
+            <a:off x="7326275" y="5628791"/>
+            <a:ext cx="434402" cy="318195"/>
           </a:xfrm>
           <a:prstGeom prst="bentConnector3">
             <a:avLst/>
@@ -4483,256 +4337,6 @@
           </a:fontRef>
         </p:style>
       </p:cxnSp>
-      <p:sp>
-        <p:nvSpPr>
-          <p:cNvPr id="80" name="Rectangle 8"/>
-          <p:cNvSpPr/>
-          <p:nvPr/>
-        </p:nvSpPr>
-        <p:spPr>
-          <a:xfrm>
-            <a:off x="7712397" y="2887216"/>
-            <a:ext cx="708186" cy="285783"/>
-          </a:xfrm>
-          <a:prstGeom prst="rect">
-            <a:avLst/>
-          </a:prstGeom>
-          <a:ln w="19050">
-            <a:solidFill>
-              <a:srgbClr val="7030A0"/>
-            </a:solidFill>
-          </a:ln>
-          <a:effectLst/>
-        </p:spPr>
-        <p:style>
-          <a:lnRef idx="1">
-            <a:schemeClr val="accent4"/>
-          </a:lnRef>
-          <a:fillRef idx="2">
-            <a:schemeClr val="accent4"/>
-          </a:fillRef>
-          <a:effectRef idx="1">
-            <a:schemeClr val="accent4"/>
-          </a:effectRef>
-          <a:fontRef idx="minor">
-            <a:schemeClr val="dk1"/>
-          </a:fontRef>
-        </p:style>
-        <p:txBody>
-          <a:bodyPr rtlCol="0" anchor="ctr"/>
-          <a:lstStyle/>
-          <a:p>
-            <a:pPr algn="ctr"/>
-            <a:r>
-              <a:rPr lang="en-US" sz="1050" dirty="0">
-                <a:solidFill>
-                  <a:srgbClr val="7030A0"/>
-                </a:solidFill>
-              </a:rPr>
-              <a:t>Phone</a:t>
-            </a:r>
-            <a:endParaRPr lang="en-SG" sz="1050" dirty="0">
-              <a:solidFill>
-                <a:srgbClr val="7030A0"/>
-              </a:solidFill>
-            </a:endParaRPr>
-          </a:p>
-        </p:txBody>
-      </p:sp>
-      <p:cxnSp>
-        <p:nvCxnSpPr>
-          <p:cNvPr id="81" name="Elbow Connector 80"/>
-          <p:cNvCxnSpPr>
-            <a:stCxn id="78" idx="3"/>
-            <a:endCxn id="80" idx="1"/>
-          </p:cNvCxnSpPr>
-          <p:nvPr/>
-        </p:nvCxnSpPr>
-        <p:spPr>
-          <a:xfrm flipV="1">
-            <a:off x="7277995" y="3030108"/>
-            <a:ext cx="434402" cy="4783"/>
-          </a:xfrm>
-          <a:prstGeom prst="bentConnector3">
-            <a:avLst/>
-          </a:prstGeom>
-          <a:ln w="19050">
-            <a:solidFill>
-              <a:srgbClr val="7030A0"/>
-            </a:solidFill>
-            <a:headEnd type="none" w="med" len="med"/>
-            <a:tailEnd type="arrow" w="med" len="med"/>
-          </a:ln>
-          <a:effectLst/>
-        </p:spPr>
-        <p:style>
-          <a:lnRef idx="1">
-            <a:schemeClr val="accent2"/>
-          </a:lnRef>
-          <a:fillRef idx="2">
-            <a:schemeClr val="accent2"/>
-          </a:fillRef>
-          <a:effectRef idx="1">
-            <a:schemeClr val="accent2"/>
-          </a:effectRef>
-          <a:fontRef idx="minor">
-            <a:schemeClr val="dk1"/>
-          </a:fontRef>
-        </p:style>
-      </p:cxnSp>
-      <p:sp>
-        <p:nvSpPr>
-          <p:cNvPr id="83" name="Rectangle 8"/>
-          <p:cNvSpPr/>
-          <p:nvPr/>
-        </p:nvSpPr>
-        <p:spPr>
-          <a:xfrm>
-            <a:off x="7712397" y="3210194"/>
-            <a:ext cx="708186" cy="285783"/>
-          </a:xfrm>
-          <a:prstGeom prst="rect">
-            <a:avLst/>
-          </a:prstGeom>
-          <a:ln w="19050">
-            <a:solidFill>
-              <a:srgbClr val="7030A0"/>
-            </a:solidFill>
-          </a:ln>
-          <a:effectLst/>
-        </p:spPr>
-        <p:style>
-          <a:lnRef idx="1">
-            <a:schemeClr val="accent4"/>
-          </a:lnRef>
-          <a:fillRef idx="2">
-            <a:schemeClr val="accent4"/>
-          </a:fillRef>
-          <a:effectRef idx="1">
-            <a:schemeClr val="accent4"/>
-          </a:effectRef>
-          <a:fontRef idx="minor">
-            <a:schemeClr val="dk1"/>
-          </a:fontRef>
-        </p:style>
-        <p:txBody>
-          <a:bodyPr rtlCol="0" anchor="ctr"/>
-          <a:lstStyle/>
-          <a:p>
-            <a:pPr algn="ctr"/>
-            <a:r>
-              <a:rPr lang="en-US" sz="1050" dirty="0">
-                <a:solidFill>
-                  <a:srgbClr val="7030A0"/>
-                </a:solidFill>
-              </a:rPr>
-              <a:t>Email</a:t>
-            </a:r>
-            <a:endParaRPr lang="en-SG" sz="1050" dirty="0">
-              <a:solidFill>
-                <a:srgbClr val="7030A0"/>
-              </a:solidFill>
-            </a:endParaRPr>
-          </a:p>
-        </p:txBody>
-      </p:sp>
-      <p:cxnSp>
-        <p:nvCxnSpPr>
-          <p:cNvPr id="84" name="Elbow Connector 83"/>
-          <p:cNvCxnSpPr>
-            <a:stCxn id="78" idx="3"/>
-            <a:endCxn id="83" idx="1"/>
-          </p:cNvCxnSpPr>
-          <p:nvPr/>
-        </p:nvCxnSpPr>
-        <p:spPr>
-          <a:xfrm>
-            <a:off x="7277995" y="3034891"/>
-            <a:ext cx="434402" cy="318195"/>
-          </a:xfrm>
-          <a:prstGeom prst="bentConnector3">
-            <a:avLst/>
-          </a:prstGeom>
-          <a:ln w="19050">
-            <a:solidFill>
-              <a:srgbClr val="7030A0"/>
-            </a:solidFill>
-            <a:headEnd type="none" w="med" len="med"/>
-            <a:tailEnd type="arrow" w="med" len="med"/>
-          </a:ln>
-          <a:effectLst/>
-        </p:spPr>
-        <p:style>
-          <a:lnRef idx="1">
-            <a:schemeClr val="accent2"/>
-          </a:lnRef>
-          <a:fillRef idx="2">
-            <a:schemeClr val="accent2"/>
-          </a:fillRef>
-          <a:effectRef idx="1">
-            <a:schemeClr val="accent2"/>
-          </a:effectRef>
-          <a:fontRef idx="minor">
-            <a:schemeClr val="dk1"/>
-          </a:fontRef>
-        </p:style>
-      </p:cxnSp>
-      <p:sp>
-        <p:nvSpPr>
-          <p:cNvPr id="85" name="Rectangle 8"/>
-          <p:cNvSpPr/>
-          <p:nvPr/>
-        </p:nvSpPr>
-        <p:spPr>
-          <a:xfrm>
-            <a:off x="7712397" y="3533171"/>
-            <a:ext cx="708186" cy="285783"/>
-          </a:xfrm>
-          <a:prstGeom prst="rect">
-            <a:avLst/>
-          </a:prstGeom>
-          <a:ln w="19050">
-            <a:solidFill>
-              <a:srgbClr val="7030A0"/>
-            </a:solidFill>
-          </a:ln>
-          <a:effectLst/>
-        </p:spPr>
-        <p:style>
-          <a:lnRef idx="1">
-            <a:schemeClr val="accent4"/>
-          </a:lnRef>
-          <a:fillRef idx="2">
-            <a:schemeClr val="accent4"/>
-          </a:fillRef>
-          <a:effectRef idx="1">
-            <a:schemeClr val="accent4"/>
-          </a:effectRef>
-          <a:fontRef idx="minor">
-            <a:schemeClr val="dk1"/>
-          </a:fontRef>
-        </p:style>
-        <p:txBody>
-          <a:bodyPr rtlCol="0" anchor="ctr"/>
-          <a:lstStyle/>
-          <a:p>
-            <a:pPr algn="ctr"/>
-            <a:r>
-              <a:rPr lang="en-US" sz="1050" dirty="0">
-                <a:solidFill>
-                  <a:srgbClr val="7030A0"/>
-                </a:solidFill>
-              </a:rPr>
-              <a:t>Address</a:t>
-            </a:r>
-            <a:endParaRPr lang="en-SG" sz="1050" dirty="0">
-              <a:solidFill>
-                <a:srgbClr val="7030A0"/>
-              </a:solidFill>
-            </a:endParaRPr>
-          </a:p>
-        </p:txBody>
-      </p:sp>
       <p:cxnSp>
         <p:nvCxnSpPr>
           <p:cNvPr id="86" name="Elbow Connector 85"/>
@@ -4744,7 +4348,7 @@
         </p:nvCxnSpPr>
         <p:spPr>
           <a:xfrm>
-            <a:off x="7277995" y="3034891"/>
+            <a:off x="7326275" y="5628791"/>
             <a:ext cx="434402" cy="641172"/>
           </a:xfrm>
           <a:prstGeom prst="bentConnector3">
@@ -4873,8 +4477,8 @@
         </p:nvSpPr>
         <p:spPr>
           <a:xfrm>
-            <a:off x="1260922" y="1998350"/>
-            <a:ext cx="1443661" cy="364396"/>
+            <a:off x="609599" y="1998349"/>
+            <a:ext cx="1829379" cy="413281"/>
           </a:xfrm>
           <a:prstGeom prst="rect">
             <a:avLst/>
@@ -4921,12 +4525,12 @@
               </a:rPr>
             </a:br>
             <a:r>
-              <a:rPr lang="en-US" sz="1050" dirty="0" err="1">
+              <a:rPr lang="en-US" sz="1050" dirty="0">
                 <a:solidFill>
                   <a:srgbClr val="7030A0"/>
                 </a:solidFill>
               </a:rPr>
-              <a:t>ReadOnlyAddressBook</a:t>
+              <a:t>ReadOnlyFinancialDatabase</a:t>
             </a:r>
             <a:endParaRPr lang="en-SG" sz="1050" dirty="0">
               <a:solidFill>
@@ -5023,16 +4627,8 @@
               </a:rPr>
               <a:t>&lt;&lt;interface&gt;&gt;</a:t>
             </a:r>
-            <a:r>
-              <a:rPr lang="en-US" sz="1050">
-                <a:solidFill>
-                  <a:srgbClr val="7030A0"/>
-                </a:solidFill>
-              </a:rPr>
-              <a:t/>
-            </a:r>
             <a:br>
-              <a:rPr lang="en-US" sz="1050">
+              <a:rPr lang="en-US" sz="1050" dirty="0">
                 <a:solidFill>
                   <a:srgbClr val="7030A0"/>
                 </a:solidFill>
@@ -5065,8 +4661,8 @@
         </p:nvCxnSpPr>
         <p:spPr>
           <a:xfrm rot="16200000" flipH="1">
-            <a:off x="1364475" y="3719944"/>
-            <a:ext cx="831471" cy="554381"/>
+            <a:off x="1212075" y="3567544"/>
+            <a:ext cx="831471" cy="859181"/>
           </a:xfrm>
           <a:prstGeom prst="bentConnector2">
             <a:avLst/>
@@ -5104,7 +4700,7 @@
         </p:nvSpPr>
         <p:spPr>
           <a:xfrm>
-            <a:off x="4429979" y="3111479"/>
+            <a:off x="4839943" y="3111479"/>
             <a:ext cx="189257" cy="178683"/>
           </a:xfrm>
           <a:prstGeom prst="rect">
@@ -5143,7 +4739,7 @@
         </p:nvSpPr>
         <p:spPr>
           <a:xfrm>
-            <a:off x="6135256" y="3097917"/>
+            <a:off x="6054827" y="3334675"/>
             <a:ext cx="189257" cy="178683"/>
           </a:xfrm>
           <a:prstGeom prst="rect">
@@ -5291,22 +4887,505 @@
           </a:p>
         </p:txBody>
       </p:sp>
-      <p:sp>
-        <p:nvSpPr>
-          <p:cNvPr id="52" name="Rectangle 8">
+      <p:grpSp>
+        <p:nvGrpSpPr>
+          <p:cNvPr id="14" name="Group 13">
             <a:extLst>
               <a:ext uri="{FF2B5EF4-FFF2-40B4-BE49-F238E27FC236}">
-                <a16:creationId xmlns:a16="http://schemas.microsoft.com/office/drawing/2014/main" id="{ABDCDBD2-131A-4B66-A2F2-43BBEE82C773}"/>
+                <a16:creationId xmlns:a16="http://schemas.microsoft.com/office/drawing/2014/main" id="{C948861A-F49D-5548-80F9-7FF47E958508}"/>
               </a:ext>
             </a:extLst>
           </p:cNvPr>
+          <p:cNvGrpSpPr/>
+          <p:nvPr/>
+        </p:nvGrpSpPr>
+        <p:grpSpPr>
+          <a:xfrm>
+            <a:off x="7090227" y="4822717"/>
+            <a:ext cx="1378636" cy="1590137"/>
+            <a:chOff x="7041947" y="2228817"/>
+            <a:chExt cx="1378636" cy="1590137"/>
+          </a:xfrm>
+        </p:grpSpPr>
+        <p:sp>
+          <p:nvSpPr>
+            <p:cNvPr id="76" name="Rectangle 8"/>
+            <p:cNvSpPr/>
+            <p:nvPr/>
+          </p:nvSpPr>
+          <p:spPr>
+            <a:xfrm>
+              <a:off x="7712397" y="2564238"/>
+              <a:ext cx="708186" cy="285783"/>
+            </a:xfrm>
+            <a:prstGeom prst="rect">
+              <a:avLst/>
+            </a:prstGeom>
+            <a:ln w="19050">
+              <a:solidFill>
+                <a:srgbClr val="7030A0"/>
+              </a:solidFill>
+            </a:ln>
+            <a:effectLst/>
+          </p:spPr>
+          <p:style>
+            <a:lnRef idx="1">
+              <a:schemeClr val="accent4"/>
+            </a:lnRef>
+            <a:fillRef idx="2">
+              <a:schemeClr val="accent4"/>
+            </a:fillRef>
+            <a:effectRef idx="1">
+              <a:schemeClr val="accent4"/>
+            </a:effectRef>
+            <a:fontRef idx="minor">
+              <a:schemeClr val="dk1"/>
+            </a:fontRef>
+          </p:style>
+          <p:txBody>
+            <a:bodyPr rtlCol="0" anchor="ctr"/>
+            <a:lstStyle/>
+            <a:p>
+              <a:pPr algn="ctr"/>
+              <a:r>
+                <a:rPr lang="en-US" sz="1050" dirty="0">
+                  <a:solidFill>
+                    <a:srgbClr val="7030A0"/>
+                  </a:solidFill>
+                </a:rPr>
+                <a:t>Name</a:t>
+              </a:r>
+              <a:endParaRPr lang="en-SG" sz="1050" dirty="0">
+                <a:solidFill>
+                  <a:srgbClr val="7030A0"/>
+                </a:solidFill>
+              </a:endParaRPr>
+            </a:p>
+          </p:txBody>
+        </p:sp>
+        <p:sp>
+          <p:nvSpPr>
+            <p:cNvPr id="78" name="Flowchart: Decision 96"/>
+            <p:cNvSpPr/>
+            <p:nvPr/>
+          </p:nvSpPr>
+          <p:spPr>
+            <a:xfrm>
+              <a:off x="7041947" y="2948201"/>
+              <a:ext cx="236048" cy="173380"/>
+            </a:xfrm>
+            <a:prstGeom prst="flowChartDecision">
+              <a:avLst/>
+            </a:prstGeom>
+            <a:solidFill>
+              <a:srgbClr val="7030A0"/>
+            </a:solidFill>
+            <a:ln w="19050">
+              <a:solidFill>
+                <a:srgbClr val="7030A0"/>
+              </a:solidFill>
+            </a:ln>
+            <a:effectLst/>
+          </p:spPr>
+          <p:style>
+            <a:lnRef idx="1">
+              <a:schemeClr val="accent6"/>
+            </a:lnRef>
+            <a:fillRef idx="2">
+              <a:schemeClr val="accent6"/>
+            </a:fillRef>
+            <a:effectRef idx="1">
+              <a:schemeClr val="accent6"/>
+            </a:effectRef>
+            <a:fontRef idx="minor">
+              <a:schemeClr val="dk1"/>
+            </a:fontRef>
+          </p:style>
+          <p:txBody>
+            <a:bodyPr rtlCol="0" anchor="ctr"/>
+            <a:lstStyle/>
+            <a:p>
+              <a:pPr algn="ctr"/>
+              <a:endParaRPr lang="en-US" sz="1050"/>
+            </a:p>
+          </p:txBody>
+        </p:sp>
+        <p:cxnSp>
+          <p:nvCxnSpPr>
+            <p:cNvPr id="79" name="Elbow Connector 78"/>
+            <p:cNvCxnSpPr>
+              <a:cxnSpLocks/>
+            </p:cNvCxnSpPr>
+            <p:nvPr/>
+          </p:nvCxnSpPr>
+          <p:spPr>
+            <a:xfrm flipV="1">
+              <a:off x="7277995" y="2706821"/>
+              <a:ext cx="434402" cy="327761"/>
+            </a:xfrm>
+            <a:prstGeom prst="bentConnector3">
+              <a:avLst/>
+            </a:prstGeom>
+            <a:ln w="19050">
+              <a:solidFill>
+                <a:srgbClr val="7030A0"/>
+              </a:solidFill>
+              <a:headEnd type="none" w="med" len="med"/>
+              <a:tailEnd type="arrow" w="med" len="med"/>
+            </a:ln>
+            <a:effectLst/>
+          </p:spPr>
+          <p:style>
+            <a:lnRef idx="1">
+              <a:schemeClr val="accent2"/>
+            </a:lnRef>
+            <a:fillRef idx="2">
+              <a:schemeClr val="accent2"/>
+            </a:fillRef>
+            <a:effectRef idx="1">
+              <a:schemeClr val="accent2"/>
+            </a:effectRef>
+            <a:fontRef idx="minor">
+              <a:schemeClr val="dk1"/>
+            </a:fontRef>
+          </p:style>
+        </p:cxnSp>
+        <p:sp>
+          <p:nvSpPr>
+            <p:cNvPr id="80" name="Rectangle 8"/>
+            <p:cNvSpPr/>
+            <p:nvPr/>
+          </p:nvSpPr>
+          <p:spPr>
+            <a:xfrm>
+              <a:off x="7712397" y="2887216"/>
+              <a:ext cx="708186" cy="285783"/>
+            </a:xfrm>
+            <a:prstGeom prst="rect">
+              <a:avLst/>
+            </a:prstGeom>
+            <a:ln w="19050">
+              <a:solidFill>
+                <a:srgbClr val="7030A0"/>
+              </a:solidFill>
+            </a:ln>
+            <a:effectLst/>
+          </p:spPr>
+          <p:style>
+            <a:lnRef idx="1">
+              <a:schemeClr val="accent4"/>
+            </a:lnRef>
+            <a:fillRef idx="2">
+              <a:schemeClr val="accent4"/>
+            </a:fillRef>
+            <a:effectRef idx="1">
+              <a:schemeClr val="accent4"/>
+            </a:effectRef>
+            <a:fontRef idx="minor">
+              <a:schemeClr val="dk1"/>
+            </a:fontRef>
+          </p:style>
+          <p:txBody>
+            <a:bodyPr rtlCol="0" anchor="ctr"/>
+            <a:lstStyle/>
+            <a:p>
+              <a:pPr algn="ctr"/>
+              <a:r>
+                <a:rPr lang="en-US" sz="1050" dirty="0">
+                  <a:solidFill>
+                    <a:srgbClr val="7030A0"/>
+                  </a:solidFill>
+                </a:rPr>
+                <a:t>Phone</a:t>
+              </a:r>
+              <a:endParaRPr lang="en-SG" sz="1050" dirty="0">
+                <a:solidFill>
+                  <a:srgbClr val="7030A0"/>
+                </a:solidFill>
+              </a:endParaRPr>
+            </a:p>
+          </p:txBody>
+        </p:sp>
+        <p:sp>
+          <p:nvSpPr>
+            <p:cNvPr id="83" name="Rectangle 8"/>
+            <p:cNvSpPr/>
+            <p:nvPr/>
+          </p:nvSpPr>
+          <p:spPr>
+            <a:xfrm>
+              <a:off x="7712397" y="3210194"/>
+              <a:ext cx="708186" cy="285783"/>
+            </a:xfrm>
+            <a:prstGeom prst="rect">
+              <a:avLst/>
+            </a:prstGeom>
+            <a:ln w="19050">
+              <a:solidFill>
+                <a:srgbClr val="7030A0"/>
+              </a:solidFill>
+            </a:ln>
+            <a:effectLst/>
+          </p:spPr>
+          <p:style>
+            <a:lnRef idx="1">
+              <a:schemeClr val="accent4"/>
+            </a:lnRef>
+            <a:fillRef idx="2">
+              <a:schemeClr val="accent4"/>
+            </a:fillRef>
+            <a:effectRef idx="1">
+              <a:schemeClr val="accent4"/>
+            </a:effectRef>
+            <a:fontRef idx="minor">
+              <a:schemeClr val="dk1"/>
+            </a:fontRef>
+          </p:style>
+          <p:txBody>
+            <a:bodyPr rtlCol="0" anchor="ctr"/>
+            <a:lstStyle/>
+            <a:p>
+              <a:pPr algn="ctr"/>
+              <a:r>
+                <a:rPr lang="en-US" sz="1050" dirty="0">
+                  <a:solidFill>
+                    <a:srgbClr val="7030A0"/>
+                  </a:solidFill>
+                </a:rPr>
+                <a:t>Email</a:t>
+              </a:r>
+              <a:endParaRPr lang="en-SG" sz="1050" dirty="0">
+                <a:solidFill>
+                  <a:srgbClr val="7030A0"/>
+                </a:solidFill>
+              </a:endParaRPr>
+            </a:p>
+          </p:txBody>
+        </p:sp>
+        <p:sp>
+          <p:nvSpPr>
+            <p:cNvPr id="85" name="Rectangle 8"/>
+            <p:cNvSpPr/>
+            <p:nvPr/>
+          </p:nvSpPr>
+          <p:spPr>
+            <a:xfrm>
+              <a:off x="7712397" y="3533171"/>
+              <a:ext cx="708186" cy="285783"/>
+            </a:xfrm>
+            <a:prstGeom prst="rect">
+              <a:avLst/>
+            </a:prstGeom>
+            <a:ln w="19050">
+              <a:solidFill>
+                <a:srgbClr val="7030A0"/>
+              </a:solidFill>
+            </a:ln>
+            <a:effectLst/>
+          </p:spPr>
+          <p:style>
+            <a:lnRef idx="1">
+              <a:schemeClr val="accent4"/>
+            </a:lnRef>
+            <a:fillRef idx="2">
+              <a:schemeClr val="accent4"/>
+            </a:fillRef>
+            <a:effectRef idx="1">
+              <a:schemeClr val="accent4"/>
+            </a:effectRef>
+            <a:fontRef idx="minor">
+              <a:schemeClr val="dk1"/>
+            </a:fontRef>
+          </p:style>
+          <p:txBody>
+            <a:bodyPr rtlCol="0" anchor="ctr"/>
+            <a:lstStyle/>
+            <a:p>
+              <a:pPr algn="ctr"/>
+              <a:r>
+                <a:rPr lang="en-US" sz="1050" dirty="0">
+                  <a:solidFill>
+                    <a:srgbClr val="7030A0"/>
+                  </a:solidFill>
+                </a:rPr>
+                <a:t>Address</a:t>
+              </a:r>
+              <a:endParaRPr lang="en-SG" sz="1050" dirty="0">
+                <a:solidFill>
+                  <a:srgbClr val="7030A0"/>
+                </a:solidFill>
+              </a:endParaRPr>
+            </a:p>
+          </p:txBody>
+        </p:sp>
+        <p:sp>
+          <p:nvSpPr>
+            <p:cNvPr id="52" name="Rectangle 8">
+              <a:extLst>
+                <a:ext uri="{FF2B5EF4-FFF2-40B4-BE49-F238E27FC236}">
+                  <a16:creationId xmlns:a16="http://schemas.microsoft.com/office/drawing/2014/main" id="{ABDCDBD2-131A-4B66-A2F2-43BBEE82C773}"/>
+                </a:ext>
+              </a:extLst>
+            </p:cNvPr>
+            <p:cNvSpPr/>
+            <p:nvPr/>
+          </p:nvSpPr>
+          <p:spPr>
+            <a:xfrm>
+              <a:off x="7712397" y="2228817"/>
+              <a:ext cx="708186" cy="285783"/>
+            </a:xfrm>
+            <a:prstGeom prst="rect">
+              <a:avLst/>
+            </a:prstGeom>
+            <a:ln w="19050">
+              <a:solidFill>
+                <a:srgbClr val="7030A0"/>
+              </a:solidFill>
+            </a:ln>
+            <a:effectLst/>
+          </p:spPr>
+          <p:style>
+            <a:lnRef idx="1">
+              <a:schemeClr val="accent4"/>
+            </a:lnRef>
+            <a:fillRef idx="2">
+              <a:schemeClr val="accent4"/>
+            </a:fillRef>
+            <a:effectRef idx="1">
+              <a:schemeClr val="accent4"/>
+            </a:effectRef>
+            <a:fontRef idx="minor">
+              <a:schemeClr val="dk1"/>
+            </a:fontRef>
+          </p:style>
+          <p:txBody>
+            <a:bodyPr rtlCol="0" anchor="ctr"/>
+            <a:lstStyle/>
+            <a:p>
+              <a:pPr algn="ctr"/>
+              <a:r>
+                <a:rPr lang="en-US" sz="1050" dirty="0">
+                  <a:solidFill>
+                    <a:srgbClr val="7030A0"/>
+                  </a:solidFill>
+                </a:rPr>
+                <a:t>Tag</a:t>
+              </a:r>
+              <a:endParaRPr lang="en-SG" sz="1050" dirty="0">
+                <a:solidFill>
+                  <a:srgbClr val="7030A0"/>
+                </a:solidFill>
+              </a:endParaRPr>
+            </a:p>
+          </p:txBody>
+        </p:sp>
+        <p:cxnSp>
+          <p:nvCxnSpPr>
+            <p:cNvPr id="53" name="Elbow Connector 78">
+              <a:extLst>
+                <a:ext uri="{FF2B5EF4-FFF2-40B4-BE49-F238E27FC236}">
+                  <a16:creationId xmlns:a16="http://schemas.microsoft.com/office/drawing/2014/main" id="{B97967F8-618A-448B-81FD-CDFD4AF0EC64}"/>
+                </a:ext>
+              </a:extLst>
+            </p:cNvPr>
+            <p:cNvCxnSpPr>
+              <a:cxnSpLocks/>
+              <a:stCxn id="78" idx="3"/>
+              <a:endCxn id="52" idx="1"/>
+            </p:cNvCxnSpPr>
+            <p:nvPr/>
+          </p:nvCxnSpPr>
+          <p:spPr>
+            <a:xfrm flipV="1">
+              <a:off x="7277995" y="2371709"/>
+              <a:ext cx="434402" cy="663182"/>
+            </a:xfrm>
+            <a:prstGeom prst="bentConnector3">
+              <a:avLst>
+                <a:gd name="adj1" fmla="val 50000"/>
+              </a:avLst>
+            </a:prstGeom>
+            <a:ln w="19050">
+              <a:solidFill>
+                <a:srgbClr val="7030A0"/>
+              </a:solidFill>
+              <a:headEnd type="none" w="med" len="med"/>
+              <a:tailEnd type="arrow" w="med" len="med"/>
+            </a:ln>
+            <a:effectLst/>
+          </p:spPr>
+          <p:style>
+            <a:lnRef idx="1">
+              <a:schemeClr val="accent2"/>
+            </a:lnRef>
+            <a:fillRef idx="2">
+              <a:schemeClr val="accent2"/>
+            </a:fillRef>
+            <a:effectRef idx="1">
+              <a:schemeClr val="accent2"/>
+            </a:effectRef>
+            <a:fontRef idx="minor">
+              <a:schemeClr val="dk1"/>
+            </a:fontRef>
+          </p:style>
+        </p:cxnSp>
+        <p:sp>
+          <p:nvSpPr>
+            <p:cNvPr id="50" name="TextBox 49">
+              <a:extLst>
+                <a:ext uri="{FF2B5EF4-FFF2-40B4-BE49-F238E27FC236}">
+                  <a16:creationId xmlns:a16="http://schemas.microsoft.com/office/drawing/2014/main" id="{B3FA9D57-880F-49C4-AD0B-A64E30D6F403}"/>
+                </a:ext>
+              </a:extLst>
+            </p:cNvPr>
+            <p:cNvSpPr txBox="1"/>
+            <p:nvPr/>
+          </p:nvSpPr>
+          <p:spPr>
+            <a:xfrm>
+              <a:off x="7466243" y="2255711"/>
+              <a:ext cx="189257" cy="178683"/>
+            </a:xfrm>
+            <a:prstGeom prst="rect">
+              <a:avLst/>
+            </a:prstGeom>
+            <a:noFill/>
+          </p:spPr>
+          <p:txBody>
+            <a:bodyPr wrap="square" lIns="0" tIns="0" rIns="0" bIns="0" rtlCol="0">
+              <a:noAutofit/>
+            </a:bodyPr>
+            <a:lstStyle/>
+            <a:p>
+              <a:pPr algn="ctr"/>
+              <a:r>
+                <a:rPr lang="en-US" sz="1100" dirty="0">
+                  <a:solidFill>
+                    <a:srgbClr val="7030A0"/>
+                  </a:solidFill>
+                </a:rPr>
+                <a:t>*</a:t>
+              </a:r>
+              <a:endParaRPr lang="en-SG" sz="1100" dirty="0">
+                <a:solidFill>
+                  <a:srgbClr val="7030A0"/>
+                </a:solidFill>
+              </a:endParaRPr>
+            </a:p>
+          </p:txBody>
+        </p:sp>
+      </p:grpSp>
+      <p:sp>
+        <p:nvSpPr>
+          <p:cNvPr id="55" name="Rectangle 8"/>
           <p:cNvSpPr/>
           <p:nvPr/>
         </p:nvSpPr>
         <p:spPr>
           <a:xfrm>
-            <a:off x="7712397" y="2228817"/>
-            <a:ext cx="708186" cy="285783"/>
+            <a:off x="2971800" y="2022158"/>
+            <a:ext cx="1353172" cy="364396"/>
           </a:xfrm>
           <a:prstGeom prst="rect">
             <a:avLst/>
@@ -5343,7 +5422,7 @@
                   <a:srgbClr val="7030A0"/>
                 </a:solidFill>
               </a:rPr>
-              <a:t>Tag</a:t>
+              <a:t>FinancialDatabase</a:t>
             </a:r>
             <a:endParaRPr lang="en-SG" sz="1050" dirty="0">
               <a:solidFill>
@@ -5355,29 +5434,19 @@
       </p:sp>
       <p:cxnSp>
         <p:nvCxnSpPr>
-          <p:cNvPr id="53" name="Elbow Connector 78">
-            <a:extLst>
-              <a:ext uri="{FF2B5EF4-FFF2-40B4-BE49-F238E27FC236}">
-                <a16:creationId xmlns:a16="http://schemas.microsoft.com/office/drawing/2014/main" id="{B97967F8-618A-448B-81FD-CDFD4AF0EC64}"/>
-              </a:ext>
-            </a:extLst>
-          </p:cNvPr>
+          <p:cNvPr id="60" name="Straight Arrow Connector 59"/>
           <p:cNvCxnSpPr>
             <a:cxnSpLocks/>
-            <a:stCxn id="78" idx="3"/>
-            <a:endCxn id="52" idx="1"/>
           </p:cNvCxnSpPr>
           <p:nvPr/>
         </p:nvCxnSpPr>
         <p:spPr>
-          <a:xfrm flipV="1">
-            <a:off x="7277995" y="2371709"/>
-            <a:ext cx="434402" cy="663182"/>
-          </a:xfrm>
-          <a:prstGeom prst="bentConnector3">
-            <a:avLst>
-              <a:gd name="adj1" fmla="val 50000"/>
-            </a:avLst>
+          <a:xfrm>
+            <a:off x="4821966" y="3003033"/>
+            <a:ext cx="336550" cy="0"/>
+          </a:xfrm>
+          <a:prstGeom prst="straightConnector1">
+            <a:avLst/>
           </a:prstGeom>
           <a:ln w="19050">
             <a:solidFill>
@@ -5405,155 +5474,13 @@
       </p:cxnSp>
       <p:sp>
         <p:nvSpPr>
-          <p:cNvPr id="50" name="TextBox 49">
-            <a:extLst>
-              <a:ext uri="{FF2B5EF4-FFF2-40B4-BE49-F238E27FC236}">
-                <a16:creationId xmlns:a16="http://schemas.microsoft.com/office/drawing/2014/main" id="{B3FA9D57-880F-49C4-AD0B-A64E30D6F403}"/>
-              </a:ext>
-            </a:extLst>
-          </p:cNvPr>
-          <p:cNvSpPr txBox="1"/>
-          <p:nvPr/>
-        </p:nvSpPr>
-        <p:spPr>
-          <a:xfrm>
-            <a:off x="7466243" y="2255711"/>
-            <a:ext cx="189257" cy="178683"/>
-          </a:xfrm>
-          <a:prstGeom prst="rect">
-            <a:avLst/>
-          </a:prstGeom>
-          <a:noFill/>
-        </p:spPr>
-        <p:txBody>
-          <a:bodyPr wrap="square" lIns="0" tIns="0" rIns="0" bIns="0" rtlCol="0">
-            <a:noAutofit/>
-          </a:bodyPr>
-          <a:lstStyle/>
-          <a:p>
-            <a:pPr algn="ctr"/>
-            <a:r>
-              <a:rPr lang="en-US" sz="1100" dirty="0">
-                <a:solidFill>
-                  <a:srgbClr val="7030A0"/>
-                </a:solidFill>
-              </a:rPr>
-              <a:t>*</a:t>
-            </a:r>
-            <a:endParaRPr lang="en-SG" sz="1100" dirty="0">
-              <a:solidFill>
-                <a:srgbClr val="7030A0"/>
-              </a:solidFill>
-            </a:endParaRPr>
-          </a:p>
-        </p:txBody>
-      </p:sp>
-      <p:sp>
-        <p:nvSpPr>
-          <p:cNvPr id="55" name="Rectangle 8"/>
-          <p:cNvSpPr/>
-          <p:nvPr/>
-        </p:nvSpPr>
-        <p:spPr>
-          <a:xfrm>
-            <a:off x="3170181" y="1998350"/>
-            <a:ext cx="1060683" cy="364396"/>
-          </a:xfrm>
-          <a:prstGeom prst="rect">
-            <a:avLst/>
-          </a:prstGeom>
-          <a:ln w="19050">
-            <a:solidFill>
-              <a:srgbClr val="7030A0"/>
-            </a:solidFill>
-          </a:ln>
-          <a:effectLst/>
-        </p:spPr>
-        <p:style>
-          <a:lnRef idx="1">
-            <a:schemeClr val="accent4"/>
-          </a:lnRef>
-          <a:fillRef idx="2">
-            <a:schemeClr val="accent4"/>
-          </a:fillRef>
-          <a:effectRef idx="1">
-            <a:schemeClr val="accent4"/>
-          </a:effectRef>
-          <a:fontRef idx="minor">
-            <a:schemeClr val="dk1"/>
-          </a:fontRef>
-        </p:style>
-        <p:txBody>
-          <a:bodyPr rtlCol="0" anchor="ctr"/>
-          <a:lstStyle/>
-          <a:p>
-            <a:pPr algn="ctr"/>
-            <a:r>
-              <a:rPr lang="en-US" sz="1050" dirty="0" err="1">
-                <a:solidFill>
-                  <a:srgbClr val="7030A0"/>
-                </a:solidFill>
-              </a:rPr>
-              <a:t>AddressBook</a:t>
-            </a:r>
-            <a:endParaRPr lang="en-SG" sz="1050" dirty="0">
-              <a:solidFill>
-                <a:srgbClr val="7030A0"/>
-              </a:solidFill>
-            </a:endParaRPr>
-          </a:p>
-        </p:txBody>
-      </p:sp>
-      <p:cxnSp>
-        <p:nvCxnSpPr>
-          <p:cNvPr id="60" name="Straight Arrow Connector 59"/>
-          <p:cNvCxnSpPr>
-            <a:stCxn id="51" idx="1"/>
-            <a:endCxn id="49" idx="1"/>
-          </p:cNvCxnSpPr>
-          <p:nvPr/>
-        </p:nvCxnSpPr>
-        <p:spPr>
-          <a:xfrm>
-            <a:off x="4324972" y="3007222"/>
-            <a:ext cx="367678" cy="12320"/>
-          </a:xfrm>
-          <a:prstGeom prst="straightConnector1">
-            <a:avLst/>
-          </a:prstGeom>
-          <a:ln w="19050">
-            <a:solidFill>
-              <a:srgbClr val="7030A0"/>
-            </a:solidFill>
-            <a:headEnd type="none" w="med" len="med"/>
-            <a:tailEnd type="arrow" w="med" len="med"/>
-          </a:ln>
-          <a:effectLst/>
-        </p:spPr>
-        <p:style>
-          <a:lnRef idx="1">
-            <a:schemeClr val="accent2"/>
-          </a:lnRef>
-          <a:fillRef idx="2">
-            <a:schemeClr val="accent2"/>
-          </a:fillRef>
-          <a:effectRef idx="1">
-            <a:schemeClr val="accent2"/>
-          </a:effectRef>
-          <a:fontRef idx="minor">
-            <a:schemeClr val="dk1"/>
-          </a:fontRef>
-        </p:style>
-      </p:cxnSp>
-      <p:sp>
-        <p:nvSpPr>
           <p:cNvPr id="68" name="Isosceles Triangle 102"/>
           <p:cNvSpPr/>
           <p:nvPr/>
         </p:nvSpPr>
         <p:spPr>
           <a:xfrm rot="16200000">
-            <a:off x="2669073" y="2069158"/>
+            <a:off x="2437784" y="2099199"/>
             <a:ext cx="271014" cy="187417"/>
           </a:xfrm>
           <a:prstGeom prst="triangle">
@@ -5601,15 +5528,16 @@
         <p:nvCxnSpPr>
           <p:cNvPr id="69" name="Elbow Connector 63"/>
           <p:cNvCxnSpPr>
+            <a:cxnSpLocks/>
             <a:stCxn id="68" idx="3"/>
             <a:endCxn id="55" idx="1"/>
           </p:cNvCxnSpPr>
           <p:nvPr/>
         </p:nvCxnSpPr>
         <p:spPr>
-          <a:xfrm>
-            <a:off x="2898289" y="2177727"/>
-            <a:ext cx="271892" cy="2821"/>
+          <a:xfrm flipV="1">
+            <a:off x="2667000" y="2204356"/>
+            <a:ext cx="304800" cy="3412"/>
           </a:xfrm>
           <a:prstGeom prst="bentConnector3">
             <a:avLst>
@@ -5623,6 +5551,98 @@
             <a:prstDash val="sysDot"/>
             <a:headEnd type="none" w="med" len="med"/>
             <a:tailEnd type="none" w="med" len="med"/>
+          </a:ln>
+          <a:effectLst/>
+        </p:spPr>
+        <p:style>
+          <a:lnRef idx="1">
+            <a:schemeClr val="accent2"/>
+          </a:lnRef>
+          <a:fillRef idx="2">
+            <a:schemeClr val="accent2"/>
+          </a:fillRef>
+          <a:effectRef idx="1">
+            <a:schemeClr val="accent2"/>
+          </a:effectRef>
+          <a:fontRef idx="minor">
+            <a:schemeClr val="dk1"/>
+          </a:fontRef>
+        </p:style>
+      </p:cxnSp>
+      <p:cxnSp>
+        <p:nvCxnSpPr>
+          <p:cNvPr id="67" name="Straight Arrow Connector 66">
+            <a:extLst>
+              <a:ext uri="{FF2B5EF4-FFF2-40B4-BE49-F238E27FC236}">
+                <a16:creationId xmlns:a16="http://schemas.microsoft.com/office/drawing/2014/main" id="{88DF6772-B3C3-EA4C-9D80-36BA5B69817C}"/>
+              </a:ext>
+            </a:extLst>
+          </p:cNvPr>
+          <p:cNvCxnSpPr>
+            <a:cxnSpLocks/>
+          </p:cNvCxnSpPr>
+          <p:nvPr/>
+        </p:nvCxnSpPr>
+        <p:spPr>
+          <a:xfrm>
+            <a:off x="6803395" y="2998583"/>
+            <a:ext cx="336550" cy="0"/>
+          </a:xfrm>
+          <a:prstGeom prst="straightConnector1">
+            <a:avLst/>
+          </a:prstGeom>
+          <a:ln w="19050">
+            <a:solidFill>
+              <a:srgbClr val="7030A0"/>
+            </a:solidFill>
+            <a:headEnd type="none" w="med" len="med"/>
+            <a:tailEnd type="arrow" w="med" len="med"/>
+          </a:ln>
+          <a:effectLst/>
+        </p:spPr>
+        <p:style>
+          <a:lnRef idx="1">
+            <a:schemeClr val="accent2"/>
+          </a:lnRef>
+          <a:fillRef idx="2">
+            <a:schemeClr val="accent2"/>
+          </a:fillRef>
+          <a:effectRef idx="1">
+            <a:schemeClr val="accent2"/>
+          </a:effectRef>
+          <a:fontRef idx="minor">
+            <a:schemeClr val="dk1"/>
+          </a:fontRef>
+        </p:style>
+      </p:cxnSp>
+      <p:cxnSp>
+        <p:nvCxnSpPr>
+          <p:cNvPr id="72" name="Straight Arrow Connector 71">
+            <a:extLst>
+              <a:ext uri="{FF2B5EF4-FFF2-40B4-BE49-F238E27FC236}">
+                <a16:creationId xmlns:a16="http://schemas.microsoft.com/office/drawing/2014/main" id="{54CB99EB-C410-DE42-9810-57570B034199}"/>
+              </a:ext>
+            </a:extLst>
+          </p:cNvPr>
+          <p:cNvCxnSpPr>
+            <a:cxnSpLocks/>
+          </p:cNvCxnSpPr>
+          <p:nvPr/>
+        </p:nvCxnSpPr>
+        <p:spPr>
+          <a:xfrm flipV="1">
+            <a:off x="6687833" y="4157619"/>
+            <a:ext cx="1015947" cy="4022"/>
+          </a:xfrm>
+          <a:prstGeom prst="straightConnector1">
+            <a:avLst/>
+          </a:prstGeom>
+          <a:ln w="19050">
+            <a:solidFill>
+              <a:srgbClr val="7030A0"/>
+            </a:solidFill>
+            <a:headEnd type="none" w="med" len="med"/>
+            <a:tailEnd type="arrow" w="med" len="med"/>
           </a:ln>
           <a:effectLst/>
         </p:spPr>

</xml_diff>